<commit_message>
Tittle changed added abstract
titile changed
Added abstract
added folder called submitted to keep track of submissions
</commit_message>
<xml_diff>
--- a/PPT's/Problem statement.pptx
+++ b/PPT's/Problem statement.pptx
@@ -270,7 +270,7 @@
           <a:p>
             <a:fld id="{256199A9-7968-4290-8E97-22DF45FF6498}" type="datetimeFigureOut">
               <a:rPr lang="en-US" smtClean="0"/>
-              <a:t>9/8/2020</a:t>
+              <a:t>9/9/2020</a:t>
             </a:fld>
             <a:endParaRPr lang="en-US"/>
           </a:p>
@@ -468,7 +468,7 @@
           <a:p>
             <a:fld id="{256199A9-7968-4290-8E97-22DF45FF6498}" type="datetimeFigureOut">
               <a:rPr lang="en-US" smtClean="0"/>
-              <a:t>9/8/2020</a:t>
+              <a:t>9/9/2020</a:t>
             </a:fld>
             <a:endParaRPr lang="en-US"/>
           </a:p>
@@ -676,7 +676,7 @@
           <a:p>
             <a:fld id="{256199A9-7968-4290-8E97-22DF45FF6498}" type="datetimeFigureOut">
               <a:rPr lang="en-US" smtClean="0"/>
-              <a:t>9/8/2020</a:t>
+              <a:t>9/9/2020</a:t>
             </a:fld>
             <a:endParaRPr lang="en-US"/>
           </a:p>
@@ -874,7 +874,7 @@
           <a:p>
             <a:fld id="{256199A9-7968-4290-8E97-22DF45FF6498}" type="datetimeFigureOut">
               <a:rPr lang="en-US" smtClean="0"/>
-              <a:t>9/8/2020</a:t>
+              <a:t>9/9/2020</a:t>
             </a:fld>
             <a:endParaRPr lang="en-US"/>
           </a:p>
@@ -1149,7 +1149,7 @@
           <a:p>
             <a:fld id="{256199A9-7968-4290-8E97-22DF45FF6498}" type="datetimeFigureOut">
               <a:rPr lang="en-US" smtClean="0"/>
-              <a:t>9/8/2020</a:t>
+              <a:t>9/9/2020</a:t>
             </a:fld>
             <a:endParaRPr lang="en-US"/>
           </a:p>
@@ -1414,7 +1414,7 @@
           <a:p>
             <a:fld id="{256199A9-7968-4290-8E97-22DF45FF6498}" type="datetimeFigureOut">
               <a:rPr lang="en-US" smtClean="0"/>
-              <a:t>9/8/2020</a:t>
+              <a:t>9/9/2020</a:t>
             </a:fld>
             <a:endParaRPr lang="en-US"/>
           </a:p>
@@ -1826,7 +1826,7 @@
           <a:p>
             <a:fld id="{256199A9-7968-4290-8E97-22DF45FF6498}" type="datetimeFigureOut">
               <a:rPr lang="en-US" smtClean="0"/>
-              <a:t>9/8/2020</a:t>
+              <a:t>9/9/2020</a:t>
             </a:fld>
             <a:endParaRPr lang="en-US"/>
           </a:p>
@@ -1967,7 +1967,7 @@
           <a:p>
             <a:fld id="{256199A9-7968-4290-8E97-22DF45FF6498}" type="datetimeFigureOut">
               <a:rPr lang="en-US" smtClean="0"/>
-              <a:t>9/8/2020</a:t>
+              <a:t>9/9/2020</a:t>
             </a:fld>
             <a:endParaRPr lang="en-US"/>
           </a:p>
@@ -2080,7 +2080,7 @@
           <a:p>
             <a:fld id="{256199A9-7968-4290-8E97-22DF45FF6498}" type="datetimeFigureOut">
               <a:rPr lang="en-US" smtClean="0"/>
-              <a:t>9/8/2020</a:t>
+              <a:t>9/9/2020</a:t>
             </a:fld>
             <a:endParaRPr lang="en-US"/>
           </a:p>
@@ -2391,7 +2391,7 @@
           <a:p>
             <a:fld id="{256199A9-7968-4290-8E97-22DF45FF6498}" type="datetimeFigureOut">
               <a:rPr lang="en-US" smtClean="0"/>
-              <a:t>9/8/2020</a:t>
+              <a:t>9/9/2020</a:t>
             </a:fld>
             <a:endParaRPr lang="en-US"/>
           </a:p>
@@ -2679,7 +2679,7 @@
           <a:p>
             <a:fld id="{256199A9-7968-4290-8E97-22DF45FF6498}" type="datetimeFigureOut">
               <a:rPr lang="en-US" smtClean="0"/>
-              <a:t>9/8/2020</a:t>
+              <a:t>9/9/2020</a:t>
             </a:fld>
             <a:endParaRPr lang="en-US"/>
           </a:p>
@@ -2920,7 +2920,7 @@
           <a:p>
             <a:fld id="{256199A9-7968-4290-8E97-22DF45FF6498}" type="datetimeFigureOut">
               <a:rPr lang="en-US" smtClean="0"/>
-              <a:t>9/8/2020</a:t>
+              <a:t>9/9/2020</a:t>
             </a:fld>
             <a:endParaRPr lang="en-US"/>
           </a:p>
@@ -3355,12 +3355,14 @@
         </p:nvSpPr>
         <p:spPr/>
         <p:txBody>
-          <a:bodyPr/>
+          <a:bodyPr>
+            <a:normAutofit fontScale="90000"/>
+          </a:bodyPr>
           <a:lstStyle/>
           <a:p>
             <a:r>
               <a:rPr lang="en-US" dirty="0"/>
-              <a:t>Automatic student attendance tracking </a:t>
+              <a:t>STUDENT ATTENDANCE MONITORING USING FACIAL RECOGNITION IN A CLASSROOM </a:t>
             </a:r>
           </a:p>
         </p:txBody>

</xml_diff>